<commit_message>
Updated Readme and added presentation
</commit_message>
<xml_diff>
--- a/docs/WordCount-Friedl-Haider.pptx
+++ b/docs/WordCount-Friedl-Haider.pptx
@@ -13,6 +13,7 @@
     <p:sldId id="263" r:id="rId7"/>
     <p:sldId id="262" r:id="rId8"/>
     <p:sldId id="261" r:id="rId9"/>
+    <p:sldId id="264" r:id="rId10"/>
   </p:sldIdLst>
   <p:sldSz cx="12192000" cy="6858000"/>
   <p:notesSz cx="6858000" cy="9144000"/>
@@ -267,7 +268,7 @@
           <a:p>
             <a:fld id="{AA70F276-1833-4A75-9C1D-A56E2295A68D}" type="datetimeFigureOut">
               <a:rPr lang="en-US" smtClean="0"/>
-              <a:t>12/1/2022</a:t>
+              <a:t>12/3/2022</a:t>
             </a:fld>
             <a:endParaRPr lang="en-US"/>
           </a:p>
@@ -465,7 +466,7 @@
           <a:p>
             <a:fld id="{AA70F276-1833-4A75-9C1D-A56E2295A68D}" type="datetimeFigureOut">
               <a:rPr lang="en-US" smtClean="0"/>
-              <a:t>12/1/2022</a:t>
+              <a:t>12/3/2022</a:t>
             </a:fld>
             <a:endParaRPr lang="en-US"/>
           </a:p>
@@ -673,7 +674,7 @@
           <a:p>
             <a:fld id="{AA70F276-1833-4A75-9C1D-A56E2295A68D}" type="datetimeFigureOut">
               <a:rPr lang="en-US" smtClean="0"/>
-              <a:t>12/1/2022</a:t>
+              <a:t>12/3/2022</a:t>
             </a:fld>
             <a:endParaRPr lang="en-US"/>
           </a:p>
@@ -898,7 +899,7 @@
           <a:p>
             <a:fld id="{AA70F276-1833-4A75-9C1D-A56E2295A68D}" type="datetimeFigureOut">
               <a:rPr lang="en-US" smtClean="0"/>
-              <a:t>12/1/2022</a:t>
+              <a:t>12/3/2022</a:t>
             </a:fld>
             <a:endParaRPr lang="en-US"/>
           </a:p>
@@ -1174,7 +1175,7 @@
           <a:p>
             <a:fld id="{AA70F276-1833-4A75-9C1D-A56E2295A68D}" type="datetimeFigureOut">
               <a:rPr lang="en-US" smtClean="0"/>
-              <a:t>12/1/2022</a:t>
+              <a:t>12/3/2022</a:t>
             </a:fld>
             <a:endParaRPr lang="en-US"/>
           </a:p>
@@ -1444,7 +1445,7 @@
           <a:p>
             <a:fld id="{AA70F276-1833-4A75-9C1D-A56E2295A68D}" type="datetimeFigureOut">
               <a:rPr lang="en-US" smtClean="0"/>
-              <a:t>12/1/2022</a:t>
+              <a:t>12/3/2022</a:t>
             </a:fld>
             <a:endParaRPr lang="en-US"/>
           </a:p>
@@ -1856,7 +1857,7 @@
           <a:p>
             <a:fld id="{AA70F276-1833-4A75-9C1D-A56E2295A68D}" type="datetimeFigureOut">
               <a:rPr lang="en-US" smtClean="0"/>
-              <a:t>12/1/2022</a:t>
+              <a:t>12/3/2022</a:t>
             </a:fld>
             <a:endParaRPr lang="en-US"/>
           </a:p>
@@ -1997,7 +1998,7 @@
           <a:p>
             <a:fld id="{AA70F276-1833-4A75-9C1D-A56E2295A68D}" type="datetimeFigureOut">
               <a:rPr lang="en-US" smtClean="0"/>
-              <a:t>12/1/2022</a:t>
+              <a:t>12/3/2022</a:t>
             </a:fld>
             <a:endParaRPr lang="en-US"/>
           </a:p>
@@ -2110,7 +2111,7 @@
           <a:p>
             <a:fld id="{AA70F276-1833-4A75-9C1D-A56E2295A68D}" type="datetimeFigureOut">
               <a:rPr lang="en-US" smtClean="0"/>
-              <a:t>12/1/2022</a:t>
+              <a:t>12/3/2022</a:t>
             </a:fld>
             <a:endParaRPr lang="en-US"/>
           </a:p>
@@ -2421,7 +2422,7 @@
           <a:p>
             <a:fld id="{AA70F276-1833-4A75-9C1D-A56E2295A68D}" type="datetimeFigureOut">
               <a:rPr lang="en-US" smtClean="0"/>
-              <a:t>12/1/2022</a:t>
+              <a:t>12/3/2022</a:t>
             </a:fld>
             <a:endParaRPr lang="en-US"/>
           </a:p>
@@ -2712,7 +2713,7 @@
           <a:p>
             <a:fld id="{AA70F276-1833-4A75-9C1D-A56E2295A68D}" type="datetimeFigureOut">
               <a:rPr lang="en-US" smtClean="0"/>
-              <a:t>12/1/2022</a:t>
+              <a:t>12/3/2022</a:t>
             </a:fld>
             <a:endParaRPr lang="en-US"/>
           </a:p>
@@ -3020,7 +3021,7 @@
             <a:fld id="{AA70F276-1833-4A75-9C1D-A56E2295A68D}" type="datetimeFigureOut">
               <a:rPr lang="en-US" smtClean="0"/>
               <a:pPr/>
-              <a:t>12/1/2022</a:t>
+              <a:t>12/3/2022</a:t>
             </a:fld>
             <a:endParaRPr lang="en-US" dirty="0"/>
           </a:p>
@@ -4147,10 +4148,10 @@
       </p:pic>
       <p:pic>
         <p:nvPicPr>
-          <p:cNvPr id="10" name="Grafik 9">
-            <a:extLst>
-              <a:ext uri="{FF2B5EF4-FFF2-40B4-BE49-F238E27FC236}">
-                <a16:creationId xmlns:a16="http://schemas.microsoft.com/office/drawing/2014/main" id="{28E8151F-569D-206D-E077-2EC755E3EF56}"/>
+          <p:cNvPr id="5" name="Grafik 4">
+            <a:extLst>
+              <a:ext uri="{FF2B5EF4-FFF2-40B4-BE49-F238E27FC236}">
+                <a16:creationId xmlns:a16="http://schemas.microsoft.com/office/drawing/2014/main" id="{C73F21F2-C049-147D-CD8E-F7C41DD42448}"/>
               </a:ext>
             </a:extLst>
           </p:cNvPr>
@@ -4173,8 +4174,80 @@
         </p:blipFill>
         <p:spPr>
           <a:xfrm>
-            <a:off x="11190491" y="5843961"/>
-            <a:ext cx="385243" cy="422162"/>
+            <a:off x="7575775" y="4330069"/>
+            <a:ext cx="729810" cy="799750"/>
+          </a:xfrm>
+          <a:prstGeom prst="rect">
+            <a:avLst/>
+          </a:prstGeom>
+        </p:spPr>
+      </p:pic>
+      <p:pic>
+        <p:nvPicPr>
+          <p:cNvPr id="8" name="Grafik 7">
+            <a:extLst>
+              <a:ext uri="{FF2B5EF4-FFF2-40B4-BE49-F238E27FC236}">
+                <a16:creationId xmlns:a16="http://schemas.microsoft.com/office/drawing/2014/main" id="{9232517B-9F3C-0C06-3DEE-FBF64B532E00}"/>
+              </a:ext>
+            </a:extLst>
+          </p:cNvPr>
+          <p:cNvPicPr>
+            <a:picLocks noChangeAspect="1"/>
+          </p:cNvPicPr>
+          <p:nvPr/>
+        </p:nvPicPr>
+        <p:blipFill>
+          <a:blip r:embed="rId4">
+            <a:extLst>
+              <a:ext uri="{28A0092B-C50C-407E-A947-70E740481C1C}">
+                <a14:useLocalDpi xmlns:a14="http://schemas.microsoft.com/office/drawing/2010/main" val="0"/>
+              </a:ext>
+            </a:extLst>
+          </a:blip>
+          <a:stretch>
+            <a:fillRect/>
+          </a:stretch>
+        </p:blipFill>
+        <p:spPr>
+          <a:xfrm>
+            <a:off x="6090285" y="3425095"/>
+            <a:ext cx="11430" cy="7810"/>
+          </a:xfrm>
+          <a:prstGeom prst="rect">
+            <a:avLst/>
+          </a:prstGeom>
+        </p:spPr>
+      </p:pic>
+      <p:pic>
+        <p:nvPicPr>
+          <p:cNvPr id="18" name="Grafik 17">
+            <a:extLst>
+              <a:ext uri="{FF2B5EF4-FFF2-40B4-BE49-F238E27FC236}">
+                <a16:creationId xmlns:a16="http://schemas.microsoft.com/office/drawing/2014/main" id="{59469D28-9F8C-B65D-CEA1-A10ADA634E2D}"/>
+              </a:ext>
+            </a:extLst>
+          </p:cNvPr>
+          <p:cNvPicPr>
+            <a:picLocks noChangeAspect="1"/>
+          </p:cNvPicPr>
+          <p:nvPr/>
+        </p:nvPicPr>
+        <p:blipFill>
+          <a:blip r:embed="rId4">
+            <a:extLst>
+              <a:ext uri="{28A0092B-C50C-407E-A947-70E740481C1C}">
+                <a14:useLocalDpi xmlns:a14="http://schemas.microsoft.com/office/drawing/2010/main" val="0"/>
+              </a:ext>
+            </a:extLst>
+          </a:blip>
+          <a:stretch>
+            <a:fillRect/>
+          </a:stretch>
+        </p:blipFill>
+        <p:spPr>
+          <a:xfrm>
+            <a:off x="3750954" y="4393911"/>
+            <a:ext cx="891501" cy="637125"/>
           </a:xfrm>
           <a:prstGeom prst="rect">
             <a:avLst/>
@@ -4269,7 +4342,7 @@
         </p:blipFill>
         <p:spPr>
           <a:xfrm>
-            <a:off x="581124" y="2006600"/>
+            <a:off x="551068" y="2006600"/>
             <a:ext cx="11089863" cy="3618501"/>
           </a:xfrm>
         </p:spPr>
@@ -4604,7 +4677,7 @@
           <a:p>
             <a:r>
               <a:rPr lang="en-GB" dirty="0"/>
-              <a:t>runtime analysis</a:t>
+              <a:t>runtime analysis &amp; tests </a:t>
             </a:r>
           </a:p>
         </p:txBody>
@@ -4640,8 +4713,8 @@
         </p:blipFill>
         <p:spPr bwMode="auto">
           <a:xfrm>
-            <a:off x="1154086" y="2453525"/>
-            <a:ext cx="9883827" cy="2616771"/>
+            <a:off x="2754506" y="2544330"/>
+            <a:ext cx="6682988" cy="1769340"/>
           </a:xfrm>
           <a:prstGeom prst="rect">
             <a:avLst/>
@@ -4754,6 +4827,12 @@
               <a:t>Pure functions</a:t>
             </a:r>
           </a:p>
+          <a:p>
+            <a:r>
+              <a:rPr lang="en-GB" dirty="0"/>
+              <a:t>Immutability </a:t>
+            </a:r>
+          </a:p>
         </p:txBody>
       </p:sp>
     </p:spTree>
@@ -4804,39 +4883,90 @@
         </p:nvSpPr>
         <p:spPr/>
         <p:txBody>
-          <a:bodyPr/>
-          <a:lstStyle/>
-          <a:p>
-            <a:r>
-              <a:rPr lang="en-GB"/>
+          <a:bodyPr>
+            <a:normAutofit/>
+          </a:bodyPr>
+          <a:lstStyle/>
+          <a:p>
+            <a:r>
+              <a:rPr lang="en-GB" dirty="0"/>
               <a:t>lessons learned</a:t>
             </a:r>
+          </a:p>
+        </p:txBody>
+      </p:sp>
+      <p:sp>
+        <p:nvSpPr>
+          <p:cNvPr id="3" name="Inhaltsplatzhalter 2">
+            <a:extLst>
+              <a:ext uri="{FF2B5EF4-FFF2-40B4-BE49-F238E27FC236}">
+                <a16:creationId xmlns:a16="http://schemas.microsoft.com/office/drawing/2014/main" id="{1F8572F6-5B4E-67FC-180B-D695702B1BA3}"/>
+              </a:ext>
+            </a:extLst>
+          </p:cNvPr>
+          <p:cNvSpPr>
+            <a:spLocks noGrp="1"/>
+          </p:cNvSpPr>
+          <p:nvPr>
+            <p:ph idx="1"/>
+          </p:nvPr>
+        </p:nvSpPr>
+        <p:spPr>
+          <a:xfrm>
+            <a:off x="838200" y="2166300"/>
+            <a:ext cx="10515600" cy="3998306"/>
+          </a:xfrm>
+        </p:spPr>
+        <p:txBody>
+          <a:bodyPr/>
+          <a:lstStyle/>
+          <a:p>
+            <a:r>
+              <a:rPr lang="en-GB" dirty="0"/>
+              <a:t>Functional programming concepts in C++</a:t>
+            </a:r>
+          </a:p>
+          <a:p>
+            <a:pPr lvl="1"/>
+            <a:r>
+              <a:rPr lang="en-GB" dirty="0"/>
+              <a:t>Lambdas, C++ Ranges </a:t>
+            </a:r>
+          </a:p>
+          <a:p>
+            <a:r>
+              <a:rPr lang="en-GB" dirty="0"/>
+              <a:t>Memory checks with </a:t>
+            </a:r>
+            <a:r>
+              <a:rPr lang="en-GB" dirty="0" err="1"/>
+              <a:t>valgrind</a:t>
+            </a:r>
             <a:endParaRPr lang="en-GB" dirty="0"/>
           </a:p>
-        </p:txBody>
-      </p:sp>
-      <p:sp>
-        <p:nvSpPr>
-          <p:cNvPr id="3" name="Inhaltsplatzhalter 2">
-            <a:extLst>
-              <a:ext uri="{FF2B5EF4-FFF2-40B4-BE49-F238E27FC236}">
-                <a16:creationId xmlns:a16="http://schemas.microsoft.com/office/drawing/2014/main" id="{1F8572F6-5B4E-67FC-180B-D695702B1BA3}"/>
-              </a:ext>
-            </a:extLst>
-          </p:cNvPr>
-          <p:cNvSpPr>
-            <a:spLocks noGrp="1"/>
-          </p:cNvSpPr>
-          <p:nvPr>
-            <p:ph idx="1"/>
-          </p:nvPr>
-        </p:nvSpPr>
-        <p:spPr/>
-        <p:txBody>
-          <a:bodyPr/>
-          <a:lstStyle/>
-          <a:p>
-            <a:endParaRPr lang="en-GB" dirty="0"/>
+          <a:p>
+            <a:r>
+              <a:rPr lang="en-GB" dirty="0"/>
+              <a:t>Time optimization</a:t>
+            </a:r>
+          </a:p>
+          <a:p>
+            <a:pPr lvl="1"/>
+            <a:r>
+              <a:rPr lang="en-GB" dirty="0" err="1"/>
+              <a:t>libboost</a:t>
+            </a:r>
+            <a:r>
+              <a:rPr lang="en-GB" dirty="0"/>
+              <a:t>-Library</a:t>
+            </a:r>
+          </a:p>
+          <a:p>
+            <a:pPr lvl="1"/>
+            <a:r>
+              <a:rPr lang="en-GB" dirty="0"/>
+              <a:t>use of performance-optimized methods</a:t>
+            </a:r>
           </a:p>
         </p:txBody>
       </p:sp>
@@ -4844,6 +4974,118 @@
     <p:extLst>
       <p:ext uri="{BB962C8B-B14F-4D97-AF65-F5344CB8AC3E}">
         <p14:creationId xmlns:p14="http://schemas.microsoft.com/office/powerpoint/2010/main" val="2877497446"/>
+      </p:ext>
+    </p:extLst>
+  </p:cSld>
+  <p:clrMapOvr>
+    <a:masterClrMapping/>
+  </p:clrMapOvr>
+</p:sld>
+</file>
+
+<file path=ppt/slides/slide9.xml><?xml version="1.0" encoding="utf-8"?>
+<p:sld xmlns:a="http://schemas.openxmlformats.org/drawingml/2006/main" xmlns:r="http://schemas.openxmlformats.org/officeDocument/2006/relationships" xmlns:p="http://schemas.openxmlformats.org/presentationml/2006/main">
+  <p:cSld>
+    <p:spTree>
+      <p:nvGrpSpPr>
+        <p:cNvPr id="1" name=""/>
+        <p:cNvGrpSpPr/>
+        <p:nvPr/>
+      </p:nvGrpSpPr>
+      <p:grpSpPr>
+        <a:xfrm>
+          <a:off x="0" y="0"/>
+          <a:ext cx="0" cy="0"/>
+          <a:chOff x="0" y="0"/>
+          <a:chExt cx="0" cy="0"/>
+        </a:xfrm>
+      </p:grpSpPr>
+      <p:sp>
+        <p:nvSpPr>
+          <p:cNvPr id="2" name="Titel 1">
+            <a:extLst>
+              <a:ext uri="{FF2B5EF4-FFF2-40B4-BE49-F238E27FC236}">
+                <a16:creationId xmlns:a16="http://schemas.microsoft.com/office/drawing/2014/main" id="{C8E8073C-1525-3A79-B532-B0A57B0E9C36}"/>
+              </a:ext>
+            </a:extLst>
+          </p:cNvPr>
+          <p:cNvSpPr>
+            <a:spLocks noGrp="1"/>
+          </p:cNvSpPr>
+          <p:nvPr>
+            <p:ph type="title"/>
+          </p:nvPr>
+        </p:nvSpPr>
+        <p:spPr/>
+        <p:txBody>
+          <a:bodyPr>
+            <a:normAutofit/>
+          </a:bodyPr>
+          <a:lstStyle/>
+          <a:p>
+            <a:r>
+              <a:rPr lang="en-GB" dirty="0"/>
+              <a:t>failed/other approaches</a:t>
+            </a:r>
+          </a:p>
+        </p:txBody>
+      </p:sp>
+      <p:sp>
+        <p:nvSpPr>
+          <p:cNvPr id="3" name="Inhaltsplatzhalter 2">
+            <a:extLst>
+              <a:ext uri="{FF2B5EF4-FFF2-40B4-BE49-F238E27FC236}">
+                <a16:creationId xmlns:a16="http://schemas.microsoft.com/office/drawing/2014/main" id="{1F8572F6-5B4E-67FC-180B-D695702B1BA3}"/>
+              </a:ext>
+            </a:extLst>
+          </p:cNvPr>
+          <p:cNvSpPr>
+            <a:spLocks noGrp="1"/>
+          </p:cNvSpPr>
+          <p:nvPr>
+            <p:ph idx="1"/>
+          </p:nvPr>
+        </p:nvSpPr>
+        <p:spPr/>
+        <p:txBody>
+          <a:bodyPr/>
+          <a:lstStyle/>
+          <a:p>
+            <a:r>
+              <a:rPr lang="en-GB" dirty="0"/>
+              <a:t>Runtime optimization by multithreading</a:t>
+            </a:r>
+          </a:p>
+          <a:p>
+            <a:r>
+              <a:rPr lang="en-GB" dirty="0"/>
+              <a:t>Functional word count in other programming languages</a:t>
+            </a:r>
+          </a:p>
+          <a:p>
+            <a:pPr lvl="1"/>
+            <a:r>
+              <a:rPr lang="en-GB" dirty="0"/>
+              <a:t>Python</a:t>
+            </a:r>
+          </a:p>
+          <a:p>
+            <a:pPr lvl="1"/>
+            <a:r>
+              <a:rPr lang="en-GB" dirty="0" err="1"/>
+              <a:t>Nim</a:t>
+            </a:r>
+            <a:endParaRPr lang="en-GB" dirty="0"/>
+          </a:p>
+          <a:p>
+            <a:endParaRPr lang="en-GB" dirty="0"/>
+          </a:p>
+        </p:txBody>
+      </p:sp>
+    </p:spTree>
+    <p:extLst>
+      <p:ext uri="{BB962C8B-B14F-4D97-AF65-F5344CB8AC3E}">
+        <p14:creationId xmlns:p14="http://schemas.microsoft.com/office/powerpoint/2010/main" val="563318553"/>
       </p:ext>
     </p:extLst>
   </p:cSld>

</xml_diff>